<commit_message>
initial slides for deployment and multi-domain for ietf 116
</commit_message>
<xml_diff>
--- a/meetings-ietf/ietf-114/slides-114-alto-transport-07-26-working-07-26.pptx
+++ b/meetings-ietf/ietf-114/slides-114-alto-transport-07-26-working-07-26.pptx
@@ -3660,7 +3660,18 @@
                 <a:ea typeface="ＭＳ Ｐゴシック" charset="0"/>
                 <a:cs typeface="ＭＳ Ｐゴシック" charset="0"/>
               </a:rPr>
-              <a:t>ALTO New Transport using HTTP/2</a:t>
+              <a:t>ALTO over </a:t>
+            </a:r>
+            <a:r>
+              <a:rPr lang="en-US" sz="3600">
+                <a:solidFill>
+                  <a:srgbClr val="0F4D92"/>
+                </a:solidFill>
+                <a:latin typeface="Georgia" charset="0"/>
+                <a:ea typeface="ＭＳ Ｐゴシック" charset="0"/>
+                <a:cs typeface="ＭＳ Ｐゴシック" charset="0"/>
+              </a:rPr>
+              <a:t>New Transport</a:t>
             </a:r>
             <a:br>
               <a:rPr lang="en-US" sz="3600" dirty="0">

</xml_diff>